<commit_message>
update tutorial 1 slides and example
</commit_message>
<xml_diff>
--- a/tutorial/T01/tut01.pptx
+++ b/tutorial/T01/tut01.pptx
@@ -215,7 +215,7 @@
           <a:p>
             <a:fld id="{96665202-11A8-4D53-8660-14724A891A71}" type="datetimeFigureOut">
               <a:rPr lang="en-US" smtClean="0"/>
-              <a:t>1/8/2023</a:t>
+              <a:t>1/12/2023</a:t>
             </a:fld>
             <a:endParaRPr lang="en-US"/>
           </a:p>
@@ -2111,51 +2111,7 @@
           <a:bodyPr/>
           <a:lstStyle/>
           <a:p>
-            <a:r>
-              <a:rPr lang="en-US" dirty="0"/>
-              <a:t>Already discussed in class, just briefly talk about the concepts and give you more concrete tips on getting your hands on using </a:t>
-            </a:r>
-            <a:r>
-              <a:rPr lang="en-US" dirty="0" err="1"/>
-              <a:t>linux</a:t>
-            </a:r>
-            <a:r>
-              <a:rPr lang="en-US" dirty="0"/>
-              <a:t>.</a:t>
-            </a:r>
-          </a:p>
-          <a:p>
-            <a:r>
-              <a:rPr lang="en-US" dirty="0"/>
-              <a:t>What is a </a:t>
-            </a:r>
-            <a:r>
-              <a:rPr lang="en-US" dirty="0" err="1"/>
-              <a:t>linux</a:t>
-            </a:r>
             <a:endParaRPr lang="en-US" dirty="0"/>
-          </a:p>
-          <a:p>
-            <a:r>
-              <a:rPr lang="en-US" dirty="0"/>
-              <a:t>Why </a:t>
-            </a:r>
-            <a:r>
-              <a:rPr lang="en-US" dirty="0" err="1"/>
-              <a:t>linux</a:t>
-            </a:r>
-            <a:r>
-              <a:rPr lang="en-US" dirty="0"/>
-              <a:t>? What is the advantages of </a:t>
-            </a:r>
-            <a:r>
-              <a:rPr lang="en-US" dirty="0" err="1"/>
-              <a:t>linux</a:t>
-            </a:r>
-            <a:r>
-              <a:rPr lang="en-US" dirty="0"/>
-              <a:t> compared with Mac OS and windows</a:t>
-            </a:r>
           </a:p>
         </p:txBody>
       </p:sp>
@@ -2239,51 +2195,7 @@
           <a:bodyPr/>
           <a:lstStyle/>
           <a:p>
-            <a:r>
-              <a:rPr lang="en-US" dirty="0"/>
-              <a:t>Already discussed in class, just briefly talk about the concepts and give you more concrete tips on getting your hands on using </a:t>
-            </a:r>
-            <a:r>
-              <a:rPr lang="en-US" dirty="0" err="1"/>
-              <a:t>linux</a:t>
-            </a:r>
-            <a:r>
-              <a:rPr lang="en-US" dirty="0"/>
-              <a:t>.</a:t>
-            </a:r>
-          </a:p>
-          <a:p>
-            <a:r>
-              <a:rPr lang="en-US" dirty="0"/>
-              <a:t>What is a </a:t>
-            </a:r>
-            <a:r>
-              <a:rPr lang="en-US" dirty="0" err="1"/>
-              <a:t>linux</a:t>
-            </a:r>
             <a:endParaRPr lang="en-US" dirty="0"/>
-          </a:p>
-          <a:p>
-            <a:r>
-              <a:rPr lang="en-US" dirty="0"/>
-              <a:t>Why </a:t>
-            </a:r>
-            <a:r>
-              <a:rPr lang="en-US" dirty="0" err="1"/>
-              <a:t>linux</a:t>
-            </a:r>
-            <a:r>
-              <a:rPr lang="en-US" dirty="0"/>
-              <a:t>? What is the advantages of </a:t>
-            </a:r>
-            <a:r>
-              <a:rPr lang="en-US" dirty="0" err="1"/>
-              <a:t>linux</a:t>
-            </a:r>
-            <a:r>
-              <a:rPr lang="en-US" dirty="0"/>
-              <a:t> compared with Mac OS and windows</a:t>
-            </a:r>
           </a:p>
         </p:txBody>
       </p:sp>
@@ -2367,51 +2279,7 @@
           <a:bodyPr/>
           <a:lstStyle/>
           <a:p>
-            <a:r>
-              <a:rPr lang="en-US" dirty="0"/>
-              <a:t>Already discussed in class, just briefly talk about the concepts and give you more concrete tips on getting your hands on using </a:t>
-            </a:r>
-            <a:r>
-              <a:rPr lang="en-US" dirty="0" err="1"/>
-              <a:t>linux</a:t>
-            </a:r>
-            <a:r>
-              <a:rPr lang="en-US" dirty="0"/>
-              <a:t>.</a:t>
-            </a:r>
-          </a:p>
-          <a:p>
-            <a:r>
-              <a:rPr lang="en-US" dirty="0"/>
-              <a:t>What is a </a:t>
-            </a:r>
-            <a:r>
-              <a:rPr lang="en-US" dirty="0" err="1"/>
-              <a:t>linux</a:t>
-            </a:r>
             <a:endParaRPr lang="en-US" dirty="0"/>
-          </a:p>
-          <a:p>
-            <a:r>
-              <a:rPr lang="en-US" dirty="0"/>
-              <a:t>Why </a:t>
-            </a:r>
-            <a:r>
-              <a:rPr lang="en-US" dirty="0" err="1"/>
-              <a:t>linux</a:t>
-            </a:r>
-            <a:r>
-              <a:rPr lang="en-US" dirty="0"/>
-              <a:t>? What is the advantages of </a:t>
-            </a:r>
-            <a:r>
-              <a:rPr lang="en-US" dirty="0" err="1"/>
-              <a:t>linux</a:t>
-            </a:r>
-            <a:r>
-              <a:rPr lang="en-US" dirty="0"/>
-              <a:t> compared with Mac OS and windows</a:t>
-            </a:r>
           </a:p>
         </p:txBody>
       </p:sp>
@@ -2600,7 +2468,7 @@
           <a:p>
             <a:fld id="{2BC46B07-C44E-4000-8B7A-1B9F5FADE757}" type="datetimeFigureOut">
               <a:rPr lang="en-US" smtClean="0"/>
-              <a:t>1/8/2023</a:t>
+              <a:t>1/12/2023</a:t>
             </a:fld>
             <a:endParaRPr lang="en-US"/>
           </a:p>
@@ -2800,7 +2668,7 @@
           <a:p>
             <a:fld id="{2BC46B07-C44E-4000-8B7A-1B9F5FADE757}" type="datetimeFigureOut">
               <a:rPr lang="en-US" smtClean="0"/>
-              <a:t>1/8/2023</a:t>
+              <a:t>1/12/2023</a:t>
             </a:fld>
             <a:endParaRPr lang="en-US"/>
           </a:p>
@@ -3010,7 +2878,7 @@
           <a:p>
             <a:fld id="{2BC46B07-C44E-4000-8B7A-1B9F5FADE757}" type="datetimeFigureOut">
               <a:rPr lang="en-US" smtClean="0"/>
-              <a:t>1/8/2023</a:t>
+              <a:t>1/12/2023</a:t>
             </a:fld>
             <a:endParaRPr lang="en-US"/>
           </a:p>
@@ -3210,7 +3078,7 @@
           <a:p>
             <a:fld id="{2BC46B07-C44E-4000-8B7A-1B9F5FADE757}" type="datetimeFigureOut">
               <a:rPr lang="en-US" smtClean="0"/>
-              <a:t>1/8/2023</a:t>
+              <a:t>1/12/2023</a:t>
             </a:fld>
             <a:endParaRPr lang="en-US"/>
           </a:p>
@@ -3486,7 +3354,7 @@
           <a:p>
             <a:fld id="{2BC46B07-C44E-4000-8B7A-1B9F5FADE757}" type="datetimeFigureOut">
               <a:rPr lang="en-US" smtClean="0"/>
-              <a:t>1/8/2023</a:t>
+              <a:t>1/12/2023</a:t>
             </a:fld>
             <a:endParaRPr lang="en-US"/>
           </a:p>
@@ -3754,7 +3622,7 @@
           <a:p>
             <a:fld id="{2BC46B07-C44E-4000-8B7A-1B9F5FADE757}" type="datetimeFigureOut">
               <a:rPr lang="en-US" smtClean="0"/>
-              <a:t>1/8/2023</a:t>
+              <a:t>1/12/2023</a:t>
             </a:fld>
             <a:endParaRPr lang="en-US"/>
           </a:p>
@@ -4169,7 +4037,7 @@
           <a:p>
             <a:fld id="{2BC46B07-C44E-4000-8B7A-1B9F5FADE757}" type="datetimeFigureOut">
               <a:rPr lang="en-US" smtClean="0"/>
-              <a:t>1/8/2023</a:t>
+              <a:t>1/12/2023</a:t>
             </a:fld>
             <a:endParaRPr lang="en-US"/>
           </a:p>
@@ -4311,7 +4179,7 @@
           <a:p>
             <a:fld id="{2BC46B07-C44E-4000-8B7A-1B9F5FADE757}" type="datetimeFigureOut">
               <a:rPr lang="en-US" smtClean="0"/>
-              <a:t>1/8/2023</a:t>
+              <a:t>1/12/2023</a:t>
             </a:fld>
             <a:endParaRPr lang="en-US"/>
           </a:p>
@@ -4424,7 +4292,7 @@
           <a:p>
             <a:fld id="{2BC46B07-C44E-4000-8B7A-1B9F5FADE757}" type="datetimeFigureOut">
               <a:rPr lang="en-US" smtClean="0"/>
-              <a:t>1/8/2023</a:t>
+              <a:t>1/12/2023</a:t>
             </a:fld>
             <a:endParaRPr lang="en-US"/>
           </a:p>
@@ -4737,7 +4605,7 @@
           <a:p>
             <a:fld id="{2BC46B07-C44E-4000-8B7A-1B9F5FADE757}" type="datetimeFigureOut">
               <a:rPr lang="en-US" smtClean="0"/>
-              <a:t>1/8/2023</a:t>
+              <a:t>1/12/2023</a:t>
             </a:fld>
             <a:endParaRPr lang="en-US"/>
           </a:p>
@@ -5026,7 +4894,7 @@
           <a:p>
             <a:fld id="{2BC46B07-C44E-4000-8B7A-1B9F5FADE757}" type="datetimeFigureOut">
               <a:rPr lang="en-US" smtClean="0"/>
-              <a:t>1/8/2023</a:t>
+              <a:t>1/12/2023</a:t>
             </a:fld>
             <a:endParaRPr lang="en-US"/>
           </a:p>
@@ -5269,7 +5137,7 @@
           <a:p>
             <a:fld id="{2BC46B07-C44E-4000-8B7A-1B9F5FADE757}" type="datetimeFigureOut">
               <a:rPr lang="en-US" smtClean="0"/>
-              <a:t>1/8/2023</a:t>
+              <a:t>1/12/2023</a:t>
             </a:fld>
             <a:endParaRPr lang="en-US"/>
           </a:p>
@@ -6939,16 +6807,15 @@
           </p:cNvPicPr>
           <p:nvPr/>
         </p:nvPicPr>
-        <p:blipFill>
+        <p:blipFill rotWithShape="1">
           <a:blip r:embed="rId4"/>
-          <a:stretch>
-            <a:fillRect/>
-          </a:stretch>
+          <a:srcRect r="24323" b="1805"/>
+          <a:stretch/>
         </p:blipFill>
         <p:spPr>
           <a:xfrm>
             <a:off x="6058292" y="230180"/>
-            <a:ext cx="4391638" cy="342948"/>
+            <a:ext cx="3323452" cy="336748"/>
           </a:xfrm>
           <a:prstGeom prst="rect">
             <a:avLst/>
@@ -7257,7 +7124,7 @@
         </p:nvSpPr>
         <p:spPr>
           <a:xfrm>
-            <a:off x="8908330" y="755632"/>
+            <a:off x="8908328" y="1309630"/>
             <a:ext cx="3245962" cy="1323439"/>
           </a:xfrm>
           <a:prstGeom prst="rect">
@@ -7566,6 +7433,120 @@
                 <a:latin typeface="Consolas" panose="020B0609020204030204" pitchFamily="49" charset="0"/>
               </a:rPr>
               <a:t>}</a:t>
+            </a:r>
+          </a:p>
+        </p:txBody>
+      </p:sp>
+      <p:sp>
+        <p:nvSpPr>
+          <p:cNvPr id="2" name="文本框 1">
+            <a:extLst>
+              <a:ext uri="{FF2B5EF4-FFF2-40B4-BE49-F238E27FC236}">
+                <a16:creationId xmlns:a16="http://schemas.microsoft.com/office/drawing/2014/main" id="{4CB76BE8-9AE4-E1B5-B337-24F3E03AF9F6}"/>
+              </a:ext>
+            </a:extLst>
+          </p:cNvPr>
+          <p:cNvSpPr txBox="1"/>
+          <p:nvPr/>
+        </p:nvSpPr>
+        <p:spPr>
+          <a:xfrm>
+            <a:off x="8908328" y="755632"/>
+            <a:ext cx="3245961" cy="553998"/>
+          </a:xfrm>
+          <a:prstGeom prst="rect">
+            <a:avLst/>
+          </a:prstGeom>
+          <a:noFill/>
+          <a:ln w="15875">
+            <a:solidFill>
+              <a:schemeClr val="tx1"/>
+            </a:solidFill>
+          </a:ln>
+        </p:spPr>
+        <p:txBody>
+          <a:bodyPr wrap="square">
+            <a:spAutoFit/>
+          </a:bodyPr>
+          <a:lstStyle/>
+          <a:p>
+            <a:r>
+              <a:rPr lang="en-US" sz="1000" b="0" dirty="0">
+                <a:solidFill>
+                  <a:srgbClr val="515151"/>
+                </a:solidFill>
+                <a:effectLst/>
+                <a:latin typeface="Consolas" panose="020B0609020204030204" pitchFamily="49" charset="0"/>
+              </a:rPr>
+              <a:t>// </a:t>
+            </a:r>
+            <a:r>
+              <a:rPr lang="en-US" sz="1000" b="0" dirty="0" err="1">
+                <a:solidFill>
+                  <a:srgbClr val="515151"/>
+                </a:solidFill>
+                <a:effectLst/>
+                <a:latin typeface="Consolas" panose="020B0609020204030204" pitchFamily="49" charset="0"/>
+              </a:rPr>
+              <a:t>hellofunc.h</a:t>
+            </a:r>
+            <a:endParaRPr lang="en-US" sz="1000" b="0" dirty="0">
+              <a:solidFill>
+                <a:srgbClr val="292929"/>
+              </a:solidFill>
+              <a:effectLst/>
+              <a:latin typeface="Consolas" panose="020B0609020204030204" pitchFamily="49" charset="0"/>
+            </a:endParaRPr>
+          </a:p>
+          <a:p>
+            <a:br>
+              <a:rPr lang="en-US" sz="1000" b="0" dirty="0">
+                <a:solidFill>
+                  <a:srgbClr val="292929"/>
+                </a:solidFill>
+                <a:effectLst/>
+                <a:latin typeface="Consolas" panose="020B0609020204030204" pitchFamily="49" charset="0"/>
+              </a:rPr>
+            </a:br>
+            <a:r>
+              <a:rPr lang="en-US" sz="1000" b="0" dirty="0">
+                <a:solidFill>
+                  <a:srgbClr val="0F4A85"/>
+                </a:solidFill>
+                <a:effectLst/>
+                <a:latin typeface="Consolas" panose="020B0609020204030204" pitchFamily="49" charset="0"/>
+              </a:rPr>
+              <a:t>void</a:t>
+            </a:r>
+            <a:r>
+              <a:rPr lang="en-US" sz="1000" b="0" dirty="0">
+                <a:solidFill>
+                  <a:srgbClr val="292929"/>
+                </a:solidFill>
+                <a:effectLst/>
+                <a:latin typeface="Consolas" panose="020B0609020204030204" pitchFamily="49" charset="0"/>
+              </a:rPr>
+              <a:t> </a:t>
+            </a:r>
+            <a:r>
+              <a:rPr lang="en-US" sz="1000" b="0" dirty="0" err="1">
+                <a:solidFill>
+                  <a:srgbClr val="5E2CBC"/>
+                </a:solidFill>
+                <a:effectLst/>
+                <a:latin typeface="Consolas" panose="020B0609020204030204" pitchFamily="49" charset="0"/>
+              </a:rPr>
+              <a:t>myPrintHello</a:t>
+            </a:r>
+            <a:r>
+              <a:rPr lang="en-US" sz="1000" b="0" dirty="0">
+                <a:solidFill>
+                  <a:srgbClr val="292929"/>
+                </a:solidFill>
+                <a:effectLst/>
+                <a:latin typeface="Consolas" panose="020B0609020204030204" pitchFamily="49" charset="0"/>
+              </a:rPr>
+              <a:t>();</a:t>
             </a:r>
           </a:p>
         </p:txBody>
@@ -11248,13 +11229,8 @@
             </a:pPr>
             <a:r>
               <a:rPr lang="en-US" altLang="zh-CN" sz="2400" dirty="0"/>
-              <a:t>Target: objective file, executable, </a:t>
-            </a:r>
-            <a:r>
-              <a:rPr lang="en-US" altLang="zh-CN" sz="2400" dirty="0" err="1"/>
-              <a:t>lable</a:t>
-            </a:r>
-            <a:endParaRPr lang="en-US" altLang="zh-CN" sz="2400" dirty="0"/>
+              <a:t>Target: objective file, executable, label</a:t>
+            </a:r>
           </a:p>
           <a:p>
             <a:pPr marL="457200" indent="-457200">
@@ -15014,7 +14990,7 @@
               <a:buChar char="•"/>
             </a:pPr>
             <a:r>
-              <a:rPr lang="en-US" altLang="zh-CN" sz="2400" dirty="0"/>
+              <a:rPr lang="en-US" altLang="zh-CN" sz="2400" b="1" dirty="0"/>
               <a:t>Alternatives for local access(please google detailed guide by yourself)</a:t>
             </a:r>
           </a:p>
@@ -15024,7 +15000,7 @@
               <a:buChar char="•"/>
             </a:pPr>
             <a:r>
-              <a:rPr lang="en-US" altLang="zh-CN" sz="2400" dirty="0">
+              <a:rPr lang="en-US" altLang="zh-CN" sz="2400" b="1" dirty="0">
                 <a:solidFill>
                   <a:srgbClr val="0070C0"/>
                 </a:solidFill>
@@ -15038,7 +15014,7 @@
               <a:buChar char="•"/>
             </a:pPr>
             <a:r>
-              <a:rPr lang="en-US" altLang="zh-CN" sz="2400" dirty="0">
+              <a:rPr lang="en-US" altLang="zh-CN" sz="2400" b="1" dirty="0">
                 <a:solidFill>
                   <a:srgbClr val="C00000"/>
                 </a:solidFill>

</xml_diff>